<commit_message>
Updated Week 3 Slide with Recap
</commit_message>
<xml_diff>
--- a/Week3/Week 3.pptx
+++ b/Week3/Week 3.pptx
@@ -5,10 +5,10 @@
     <p:sldMasterId id="2147483660" r:id="rId1"/>
   </p:sldMasterIdLst>
   <p:notesMasterIdLst>
-    <p:notesMasterId r:id="rId23"/>
+    <p:notesMasterId r:id="rId27"/>
   </p:notesMasterIdLst>
   <p:handoutMasterIdLst>
-    <p:handoutMasterId r:id="rId24"/>
+    <p:handoutMasterId r:id="rId28"/>
   </p:handoutMasterIdLst>
   <p:sldIdLst>
     <p:sldId id="265" r:id="rId2"/>
@@ -27,16 +27,20 @@
     <p:sldId id="275" r:id="rId15"/>
     <p:sldId id="279" r:id="rId16"/>
     <p:sldId id="283" r:id="rId17"/>
-    <p:sldId id="284" r:id="rId18"/>
-    <p:sldId id="285" r:id="rId19"/>
-    <p:sldId id="276" r:id="rId20"/>
-    <p:sldId id="277" r:id="rId21"/>
-    <p:sldId id="278" r:id="rId22"/>
+    <p:sldId id="289" r:id="rId18"/>
+    <p:sldId id="286" r:id="rId19"/>
+    <p:sldId id="287" r:id="rId20"/>
+    <p:sldId id="288" r:id="rId21"/>
+    <p:sldId id="284" r:id="rId22"/>
+    <p:sldId id="285" r:id="rId23"/>
+    <p:sldId id="276" r:id="rId24"/>
+    <p:sldId id="277" r:id="rId25"/>
+    <p:sldId id="278" r:id="rId26"/>
   </p:sldIdLst>
   <p:sldSz cx="12188825" cy="6858000"/>
   <p:notesSz cx="6858000" cy="9144000"/>
   <p:custDataLst>
-    <p:tags r:id="rId25"/>
+    <p:tags r:id="rId29"/>
   </p:custDataLst>
   <p:defaultTextStyle>
     <a:defPPr>
@@ -160,7 +164,7 @@
   <pc:docChgLst>
     <pc:chgData name="Yeu Tyng Cheow" userId="e4ff6b98-79c3-4716-911b-0b298b5dc52f" providerId="ADAL" clId="{66463716-C7DD-439F-BACD-B9171C0EAF6A}"/>
     <pc:docChg chg="undo custSel addSld modSld sldOrd modMainMaster">
-      <pc:chgData name="Yeu Tyng Cheow" userId="e4ff6b98-79c3-4716-911b-0b298b5dc52f" providerId="ADAL" clId="{66463716-C7DD-439F-BACD-B9171C0EAF6A}" dt="2018-03-07T02:45:09.781" v="3384" actId="27614"/>
+      <pc:chgData name="Yeu Tyng Cheow" userId="e4ff6b98-79c3-4716-911b-0b298b5dc52f" providerId="ADAL" clId="{66463716-C7DD-439F-BACD-B9171C0EAF6A}" dt="2018-03-07T05:16:20.661" v="3391" actId="26606"/>
       <pc:docMkLst>
         <pc:docMk/>
       </pc:docMkLst>
@@ -1223,6 +1227,123 @@
           </ac:picMkLst>
         </pc:picChg>
       </pc:sldChg>
+      <pc:sldChg chg="modSp mod setBg">
+        <pc:chgData name="Yeu Tyng Cheow" userId="e4ff6b98-79c3-4716-911b-0b298b5dc52f" providerId="ADAL" clId="{66463716-C7DD-439F-BACD-B9171C0EAF6A}" dt="2018-03-07T05:16:17.682" v="3390" actId="27614"/>
+        <pc:sldMkLst>
+          <pc:docMk/>
+          <pc:sldMk cId="3864238647" sldId="287"/>
+        </pc:sldMkLst>
+        <pc:spChg chg="mod">
+          <ac:chgData name="Yeu Tyng Cheow" userId="e4ff6b98-79c3-4716-911b-0b298b5dc52f" providerId="ADAL" clId="{66463716-C7DD-439F-BACD-B9171C0EAF6A}" dt="2018-03-07T05:16:13.514" v="3389" actId="26606"/>
+          <ac:spMkLst>
+            <pc:docMk/>
+            <pc:sldMk cId="3864238647" sldId="287"/>
+            <ac:spMk id="2" creationId="{00000000-0000-0000-0000-000000000000}"/>
+          </ac:spMkLst>
+        </pc:spChg>
+        <pc:spChg chg="mod">
+          <ac:chgData name="Yeu Tyng Cheow" userId="e4ff6b98-79c3-4716-911b-0b298b5dc52f" providerId="ADAL" clId="{66463716-C7DD-439F-BACD-B9171C0EAF6A}" dt="2018-03-07T05:16:13.514" v="3389" actId="26606"/>
+          <ac:spMkLst>
+            <pc:docMk/>
+            <pc:sldMk cId="3864238647" sldId="287"/>
+            <ac:spMk id="3" creationId="{00000000-0000-0000-0000-000000000000}"/>
+          </ac:spMkLst>
+        </pc:spChg>
+        <pc:picChg chg="mod ord">
+          <ac:chgData name="Yeu Tyng Cheow" userId="e4ff6b98-79c3-4716-911b-0b298b5dc52f" providerId="ADAL" clId="{66463716-C7DD-439F-BACD-B9171C0EAF6A}" dt="2018-03-07T05:16:17.682" v="3390" actId="27614"/>
+          <ac:picMkLst>
+            <pc:docMk/>
+            <pc:sldMk cId="3864238647" sldId="287"/>
+            <ac:picMk id="5" creationId="{00000000-0000-0000-0000-000000000000}"/>
+          </ac:picMkLst>
+        </pc:picChg>
+      </pc:sldChg>
+      <pc:sldChg chg="addSp modSp mod setBg">
+        <pc:chgData name="Yeu Tyng Cheow" userId="e4ff6b98-79c3-4716-911b-0b298b5dc52f" providerId="ADAL" clId="{66463716-C7DD-439F-BACD-B9171C0EAF6A}" dt="2018-03-07T05:16:20.661" v="3391" actId="26606"/>
+        <pc:sldMkLst>
+          <pc:docMk/>
+          <pc:sldMk cId="70572723" sldId="288"/>
+        </pc:sldMkLst>
+        <pc:spChg chg="mod">
+          <ac:chgData name="Yeu Tyng Cheow" userId="e4ff6b98-79c3-4716-911b-0b298b5dc52f" providerId="ADAL" clId="{66463716-C7DD-439F-BACD-B9171C0EAF6A}" dt="2018-03-07T05:16:20.661" v="3391" actId="26606"/>
+          <ac:spMkLst>
+            <pc:docMk/>
+            <pc:sldMk cId="70572723" sldId="288"/>
+            <ac:spMk id="2" creationId="{00000000-0000-0000-0000-000000000000}"/>
+          </ac:spMkLst>
+        </pc:spChg>
+        <pc:spChg chg="mod">
+          <ac:chgData name="Yeu Tyng Cheow" userId="e4ff6b98-79c3-4716-911b-0b298b5dc52f" providerId="ADAL" clId="{66463716-C7DD-439F-BACD-B9171C0EAF6A}" dt="2018-03-07T05:16:20.661" v="3391" actId="26606"/>
+          <ac:spMkLst>
+            <pc:docMk/>
+            <pc:sldMk cId="70572723" sldId="288"/>
+            <ac:spMk id="3" creationId="{00000000-0000-0000-0000-000000000000}"/>
+          </ac:spMkLst>
+        </pc:spChg>
+        <pc:spChg chg="add">
+          <ac:chgData name="Yeu Tyng Cheow" userId="e4ff6b98-79c3-4716-911b-0b298b5dc52f" providerId="ADAL" clId="{66463716-C7DD-439F-BACD-B9171C0EAF6A}" dt="2018-03-07T05:16:20.661" v="3391" actId="26606"/>
+          <ac:spMkLst>
+            <pc:docMk/>
+            <pc:sldMk cId="70572723" sldId="288"/>
+            <ac:spMk id="8" creationId="{50E53EDA-3B94-4F6B-9E86-D3BB9EBB9616}"/>
+          </ac:spMkLst>
+        </pc:spChg>
+        <pc:cxnChg chg="add">
+          <ac:chgData name="Yeu Tyng Cheow" userId="e4ff6b98-79c3-4716-911b-0b298b5dc52f" providerId="ADAL" clId="{66463716-C7DD-439F-BACD-B9171C0EAF6A}" dt="2018-03-07T05:16:20.661" v="3391" actId="26606"/>
+          <ac:cxnSpMkLst>
+            <pc:docMk/>
+            <pc:sldMk cId="70572723" sldId="288"/>
+            <ac:cxnSpMk id="10" creationId="{30EFD79F-7790-479B-B7DB-BD0D8C101DDD}"/>
+          </ac:cxnSpMkLst>
+        </pc:cxnChg>
+      </pc:sldChg>
+      <pc:sldChg chg="addSp modSp mod setBg">
+        <pc:chgData name="Yeu Tyng Cheow" userId="e4ff6b98-79c3-4716-911b-0b298b5dc52f" providerId="ADAL" clId="{66463716-C7DD-439F-BACD-B9171C0EAF6A}" dt="2018-03-07T05:15:55.647" v="3386" actId="27614"/>
+        <pc:sldMkLst>
+          <pc:docMk/>
+          <pc:sldMk cId="131989194" sldId="289"/>
+        </pc:sldMkLst>
+        <pc:spChg chg="mod">
+          <ac:chgData name="Yeu Tyng Cheow" userId="e4ff6b98-79c3-4716-911b-0b298b5dc52f" providerId="ADAL" clId="{66463716-C7DD-439F-BACD-B9171C0EAF6A}" dt="2018-03-07T05:15:51.611" v="3385" actId="26606"/>
+          <ac:spMkLst>
+            <pc:docMk/>
+            <pc:sldMk cId="131989194" sldId="289"/>
+            <ac:spMk id="2" creationId="{00000000-0000-0000-0000-000000000000}"/>
+          </ac:spMkLst>
+        </pc:spChg>
+        <pc:spChg chg="mod">
+          <ac:chgData name="Yeu Tyng Cheow" userId="e4ff6b98-79c3-4716-911b-0b298b5dc52f" providerId="ADAL" clId="{66463716-C7DD-439F-BACD-B9171C0EAF6A}" dt="2018-03-07T05:15:51.611" v="3385" actId="26606"/>
+          <ac:spMkLst>
+            <pc:docMk/>
+            <pc:sldMk cId="131989194" sldId="289"/>
+            <ac:spMk id="3" creationId="{00000000-0000-0000-0000-000000000000}"/>
+          </ac:spMkLst>
+        </pc:spChg>
+        <pc:spChg chg="add">
+          <ac:chgData name="Yeu Tyng Cheow" userId="e4ff6b98-79c3-4716-911b-0b298b5dc52f" providerId="ADAL" clId="{66463716-C7DD-439F-BACD-B9171C0EAF6A}" dt="2018-03-07T05:15:51.611" v="3385" actId="26606"/>
+          <ac:spMkLst>
+            <pc:docMk/>
+            <pc:sldMk cId="131989194" sldId="289"/>
+            <ac:spMk id="10" creationId="{3D1E5586-8BB5-40F6-96C3-2E87DD7CE5CD}"/>
+          </ac:spMkLst>
+        </pc:spChg>
+        <pc:picChg chg="add mod">
+          <ac:chgData name="Yeu Tyng Cheow" userId="e4ff6b98-79c3-4716-911b-0b298b5dc52f" providerId="ADAL" clId="{66463716-C7DD-439F-BACD-B9171C0EAF6A}" dt="2018-03-07T05:15:55.647" v="3386" actId="27614"/>
+          <ac:picMkLst>
+            <pc:docMk/>
+            <pc:sldMk cId="131989194" sldId="289"/>
+            <ac:picMk id="8" creationId="{18BD78ED-75E1-4879-B369-BC61F7C45E22}"/>
+          </ac:picMkLst>
+        </pc:picChg>
+        <pc:cxnChg chg="add">
+          <ac:chgData name="Yeu Tyng Cheow" userId="e4ff6b98-79c3-4716-911b-0b298b5dc52f" providerId="ADAL" clId="{66463716-C7DD-439F-BACD-B9171C0EAF6A}" dt="2018-03-07T05:15:51.611" v="3385" actId="26606"/>
+          <ac:cxnSpMkLst>
+            <pc:docMk/>
+            <pc:sldMk cId="131989194" sldId="289"/>
+            <ac:cxnSpMk id="12" creationId="{8A832D40-B9E2-4CE7-9E0A-B35591EA2035}"/>
+          </ac:cxnSpMkLst>
+        </pc:cxnChg>
+      </pc:sldChg>
       <pc:sldMasterChg chg="modTransition modSldLayout">
         <pc:chgData name="Yeu Tyng Cheow" userId="e4ff6b98-79c3-4716-911b-0b298b5dc52f" providerId="ADAL" clId="{66463716-C7DD-439F-BACD-B9171C0EAF6A}" dt="2018-03-07T02:18:14.126" v="2731" actId="26606"/>
         <pc:sldMasterMkLst>
@@ -12975,6 +13096,1156 @@
       </p:cxnSp>
       <p:sp>
         <p:nvSpPr>
+          <p:cNvPr id="2" name="Title 1"/>
+          <p:cNvSpPr>
+            <a:spLocks noGrp="1"/>
+          </p:cNvSpPr>
+          <p:nvPr>
+            <p:ph type="title"/>
+          </p:nvPr>
+        </p:nvSpPr>
+        <p:spPr>
+          <a:xfrm>
+            <a:off x="1993285" y="1354668"/>
+            <a:ext cx="8202255" cy="2346475"/>
+          </a:xfrm>
+        </p:spPr>
+        <p:txBody>
+          <a:bodyPr vert="horz" lIns="91440" tIns="45720" rIns="91440" bIns="45720" rtlCol="0" anchor="b">
+            <a:normAutofit/>
+          </a:bodyPr>
+          <a:lstStyle/>
+          <a:p>
+            <a:pPr algn="ctr" defTabSz="457200"/>
+            <a:r>
+              <a:rPr lang="en-US" sz="5900"/>
+              <a:t>Quick Recap</a:t>
+            </a:r>
+          </a:p>
+        </p:txBody>
+      </p:sp>
+      <p:sp>
+        <p:nvSpPr>
+          <p:cNvPr id="3" name="Text Placeholder 2"/>
+          <p:cNvSpPr>
+            <a:spLocks noGrp="1"/>
+          </p:cNvSpPr>
+          <p:nvPr>
+            <p:ph type="body" idx="1"/>
+          </p:nvPr>
+        </p:nvSpPr>
+        <p:spPr>
+          <a:xfrm>
+            <a:off x="2496486" y="3940629"/>
+            <a:ext cx="7195852" cy="1240970"/>
+          </a:xfrm>
+        </p:spPr>
+        <p:txBody>
+          <a:bodyPr vert="horz" lIns="91440" tIns="45720" rIns="91440" bIns="45720" rtlCol="0" anchor="t">
+            <a:normAutofit/>
+          </a:bodyPr>
+          <a:lstStyle/>
+          <a:p>
+            <a:pPr algn="ctr" defTabSz="457200"/>
+            <a:r>
+              <a:rPr lang="en-US" sz="1800"/>
+              <a:t>Summarize What You Just Learnt.</a:t>
+            </a:r>
+          </a:p>
+        </p:txBody>
+      </p:sp>
+    </p:spTree>
+    <p:extLst>
+      <p:ext uri="{BB962C8B-B14F-4D97-AF65-F5344CB8AC3E}">
+        <p14:creationId xmlns:p14="http://schemas.microsoft.com/office/powerpoint/2010/main" val="131989194"/>
+      </p:ext>
+    </p:extLst>
+  </p:cSld>
+  <p:clrMapOvr>
+    <a:masterClrMapping/>
+  </p:clrMapOvr>
+  <mc:AlternateContent xmlns:mc="http://schemas.openxmlformats.org/markup-compatibility/2006">
+    <mc:Choice xmlns:p14="http://schemas.microsoft.com/office/powerpoint/2010/main" Requires="p14">
+      <p:transition spd="med" p14:dur="700">
+        <p:fade/>
+      </p:transition>
+    </mc:Choice>
+    <mc:Fallback>
+      <p:transition spd="med">
+        <p:fade/>
+      </p:transition>
+    </mc:Fallback>
+  </mc:AlternateContent>
+</p:sld>
+</file>
+
+<file path=ppt/slides/slide18.xml><?xml version="1.0" encoding="utf-8"?>
+<p:sld xmlns:a="http://schemas.openxmlformats.org/drawingml/2006/main" xmlns:r="http://schemas.openxmlformats.org/officeDocument/2006/relationships" xmlns:p="http://schemas.openxmlformats.org/presentationml/2006/main">
+  <p:cSld>
+    <p:spTree>
+      <p:nvGrpSpPr>
+        <p:cNvPr id="1" name=""/>
+        <p:cNvGrpSpPr/>
+        <p:nvPr/>
+      </p:nvGrpSpPr>
+      <p:grpSpPr>
+        <a:xfrm>
+          <a:off x="0" y="0"/>
+          <a:ext cx="0" cy="0"/>
+          <a:chOff x="0" y="0"/>
+          <a:chExt cx="0" cy="0"/>
+        </a:xfrm>
+      </p:grpSpPr>
+      <p:sp>
+        <p:nvSpPr>
+          <p:cNvPr id="2" name="Title 1"/>
+          <p:cNvSpPr>
+            <a:spLocks noGrp="1"/>
+          </p:cNvSpPr>
+          <p:nvPr>
+            <p:ph type="title"/>
+          </p:nvPr>
+        </p:nvSpPr>
+        <p:spPr/>
+        <p:txBody>
+          <a:bodyPr/>
+          <a:lstStyle/>
+          <a:p>
+            <a:r>
+              <a:rPr lang="en-US" dirty="0"/>
+              <a:t>What Is This Component?</a:t>
+            </a:r>
+          </a:p>
+        </p:txBody>
+      </p:sp>
+      <p:sp>
+        <p:nvSpPr>
+          <p:cNvPr id="3" name="Content Placeholder 2"/>
+          <p:cNvSpPr>
+            <a:spLocks noGrp="1"/>
+          </p:cNvSpPr>
+          <p:nvPr>
+            <p:ph idx="1"/>
+          </p:nvPr>
+        </p:nvSpPr>
+        <p:spPr/>
+        <p:txBody>
+          <a:bodyPr/>
+          <a:lstStyle/>
+          <a:p>
+            <a:pPr marL="342900" indent="-342900">
+              <a:buFont typeface="+mj-lt"/>
+              <a:buAutoNum type="arabicPeriod"/>
+            </a:pPr>
+            <a:r>
+              <a:rPr lang="en-US" dirty="0" err="1"/>
+              <a:t>TextBlock</a:t>
+            </a:r>
+            <a:endParaRPr lang="en-US" dirty="0"/>
+          </a:p>
+          <a:p>
+            <a:pPr marL="342900" indent="-342900">
+              <a:buFont typeface="+mj-lt"/>
+              <a:buAutoNum type="arabicPeriod"/>
+            </a:pPr>
+            <a:r>
+              <a:rPr lang="en-US" dirty="0"/>
+              <a:t>Image</a:t>
+            </a:r>
+          </a:p>
+          <a:p>
+            <a:pPr marL="342900" indent="-342900">
+              <a:buFont typeface="+mj-lt"/>
+              <a:buAutoNum type="arabicPeriod"/>
+            </a:pPr>
+            <a:r>
+              <a:rPr lang="en-US" dirty="0" err="1"/>
+              <a:t>TextBox</a:t>
+            </a:r>
+            <a:endParaRPr lang="en-US" dirty="0"/>
+          </a:p>
+          <a:p>
+            <a:pPr marL="342900" indent="-342900">
+              <a:buFont typeface="+mj-lt"/>
+              <a:buAutoNum type="arabicPeriod"/>
+            </a:pPr>
+            <a:r>
+              <a:rPr lang="en-US" dirty="0" err="1"/>
+              <a:t>ComboBox</a:t>
+            </a:r>
+            <a:endParaRPr lang="en-US" dirty="0"/>
+          </a:p>
+          <a:p>
+            <a:pPr marL="0" indent="0">
+              <a:buNone/>
+            </a:pPr>
+            <a:endParaRPr lang="en-US" dirty="0"/>
+          </a:p>
+        </p:txBody>
+      </p:sp>
+      <p:pic>
+        <p:nvPicPr>
+          <p:cNvPr id="5" name="Picture 4"/>
+          <p:cNvPicPr>
+            <a:picLocks noChangeAspect="1"/>
+          </p:cNvPicPr>
+          <p:nvPr/>
+        </p:nvPicPr>
+        <p:blipFill>
+          <a:blip r:embed="rId2"/>
+          <a:stretch>
+            <a:fillRect/>
+          </a:stretch>
+        </p:blipFill>
+        <p:spPr>
+          <a:xfrm>
+            <a:off x="685623" y="1905000"/>
+            <a:ext cx="10572750" cy="952500"/>
+          </a:xfrm>
+          <a:prstGeom prst="rect">
+            <a:avLst/>
+          </a:prstGeom>
+        </p:spPr>
+      </p:pic>
+    </p:spTree>
+    <p:extLst>
+      <p:ext uri="{BB962C8B-B14F-4D97-AF65-F5344CB8AC3E}">
+        <p14:creationId xmlns:p14="http://schemas.microsoft.com/office/powerpoint/2010/main" val="859107620"/>
+      </p:ext>
+    </p:extLst>
+  </p:cSld>
+  <p:clrMapOvr>
+    <a:masterClrMapping/>
+  </p:clrMapOvr>
+  <mc:AlternateContent xmlns:mc="http://schemas.openxmlformats.org/markup-compatibility/2006" xmlns:p14="http://schemas.microsoft.com/office/powerpoint/2010/main">
+    <mc:Choice Requires="p14">
+      <p:transition spd="med" p14:dur="700">
+        <p:fade/>
+      </p:transition>
+    </mc:Choice>
+    <mc:Fallback xmlns="">
+      <p:transition spd="med">
+        <p:fade/>
+      </p:transition>
+    </mc:Fallback>
+  </mc:AlternateContent>
+</p:sld>
+</file>
+
+<file path=ppt/slides/slide19.xml><?xml version="1.0" encoding="utf-8"?>
+<p:sld xmlns:a="http://schemas.openxmlformats.org/drawingml/2006/main" xmlns:r="http://schemas.openxmlformats.org/officeDocument/2006/relationships" xmlns:p="http://schemas.openxmlformats.org/presentationml/2006/main">
+  <p:cSld>
+    <p:bg>
+      <p:bgPr>
+        <a:blipFill>
+          <a:blip r:embed="rId2">
+            <a:extLst/>
+          </a:blip>
+          <a:stretch/>
+        </a:blipFill>
+        <a:effectLst/>
+      </p:bgPr>
+    </p:bg>
+    <p:spTree>
+      <p:nvGrpSpPr>
+        <p:cNvPr id="1" name=""/>
+        <p:cNvGrpSpPr/>
+        <p:nvPr/>
+      </p:nvGrpSpPr>
+      <p:grpSpPr>
+        <a:xfrm>
+          <a:off x="0" y="0"/>
+          <a:ext cx="0" cy="0"/>
+          <a:chOff x="0" y="0"/>
+          <a:chExt cx="0" cy="0"/>
+        </a:xfrm>
+      </p:grpSpPr>
+      <p:pic>
+        <p:nvPicPr>
+          <p:cNvPr id="5" name="Picture 4" descr="A screenshot of a cell phone&#10;&#10;Description generated with very high confidence"/>
+          <p:cNvPicPr>
+            <a:picLocks noChangeAspect="1"/>
+          </p:cNvPicPr>
+          <p:nvPr/>
+        </p:nvPicPr>
+        <p:blipFill>
+          <a:blip r:embed="rId3"/>
+          <a:stretch>
+            <a:fillRect/>
+          </a:stretch>
+        </p:blipFill>
+        <p:spPr>
+          <a:xfrm>
+            <a:off x="643296" y="1330336"/>
+            <a:ext cx="6896082" cy="4206609"/>
+          </a:xfrm>
+          <a:prstGeom prst="roundRect">
+            <a:avLst>
+              <a:gd name="adj" fmla="val 4380"/>
+            </a:avLst>
+          </a:prstGeom>
+          <a:ln w="50800" cap="sq" cmpd="dbl">
+            <a:gradFill flip="none" rotWithShape="1">
+              <a:gsLst>
+                <a:gs pos="0">
+                  <a:srgbClr val="FFFFFF"/>
+                </a:gs>
+                <a:gs pos="100000">
+                  <a:schemeClr val="tx1">
+                    <a:alpha val="0"/>
+                  </a:schemeClr>
+                </a:gs>
+              </a:gsLst>
+              <a:path path="circle">
+                <a:fillToRect l="50000" t="50000" r="50000" b="50000"/>
+              </a:path>
+              <a:tileRect/>
+            </a:gradFill>
+            <a:miter lim="800000"/>
+          </a:ln>
+          <a:effectLst>
+            <a:outerShdw blurRad="254000" algn="tl" rotWithShape="0">
+              <a:srgbClr val="000000">
+                <a:alpha val="43000"/>
+              </a:srgbClr>
+            </a:outerShdw>
+          </a:effectLst>
+        </p:spPr>
+      </p:pic>
+      <p:sp>
+        <p:nvSpPr>
+          <p:cNvPr id="2" name="Title 1"/>
+          <p:cNvSpPr>
+            <a:spLocks noGrp="1"/>
+          </p:cNvSpPr>
+          <p:nvPr>
+            <p:ph type="title"/>
+          </p:nvPr>
+        </p:nvSpPr>
+        <p:spPr>
+          <a:xfrm>
+            <a:off x="7863757" y="643463"/>
+            <a:ext cx="3705797" cy="1608124"/>
+          </a:xfrm>
+        </p:spPr>
+        <p:txBody>
+          <a:bodyPr>
+            <a:normAutofit/>
+          </a:bodyPr>
+          <a:lstStyle/>
+          <a:p>
+            <a:r>
+              <a:rPr lang="en-US" dirty="0"/>
+              <a:t>What is This Component?</a:t>
+            </a:r>
+          </a:p>
+        </p:txBody>
+      </p:sp>
+      <p:sp>
+        <p:nvSpPr>
+          <p:cNvPr id="3" name="Content Placeholder 2"/>
+          <p:cNvSpPr>
+            <a:spLocks noGrp="1"/>
+          </p:cNvSpPr>
+          <p:nvPr>
+            <p:ph idx="1"/>
+          </p:nvPr>
+        </p:nvSpPr>
+        <p:spPr>
+          <a:xfrm>
+            <a:off x="7863757" y="2251587"/>
+            <a:ext cx="3705797" cy="3972232"/>
+          </a:xfrm>
+        </p:spPr>
+        <p:txBody>
+          <a:bodyPr>
+            <a:normAutofit/>
+          </a:bodyPr>
+          <a:lstStyle/>
+          <a:p>
+            <a:pPr marL="342900" indent="-342900">
+              <a:buFont typeface="+mj-lt"/>
+              <a:buAutoNum type="arabicPeriod"/>
+            </a:pPr>
+            <a:r>
+              <a:rPr lang="en-US" dirty="0" err="1"/>
+              <a:t>TextBox</a:t>
+            </a:r>
+            <a:endParaRPr lang="en-US" dirty="0"/>
+          </a:p>
+          <a:p>
+            <a:pPr marL="342900" indent="-342900">
+              <a:buFont typeface="+mj-lt"/>
+              <a:buAutoNum type="arabicPeriod"/>
+            </a:pPr>
+            <a:r>
+              <a:rPr lang="en-US" dirty="0"/>
+              <a:t>Button</a:t>
+            </a:r>
+          </a:p>
+          <a:p>
+            <a:pPr marL="342900" indent="-342900">
+              <a:buFont typeface="+mj-lt"/>
+              <a:buAutoNum type="arabicPeriod"/>
+            </a:pPr>
+            <a:r>
+              <a:rPr lang="en-US" dirty="0"/>
+              <a:t>Slider</a:t>
+            </a:r>
+          </a:p>
+          <a:p>
+            <a:pPr marL="342900" indent="-342900">
+              <a:buFont typeface="+mj-lt"/>
+              <a:buAutoNum type="arabicPeriod"/>
+            </a:pPr>
+            <a:r>
+              <a:rPr lang="en-US" dirty="0" err="1"/>
+              <a:t>ComboBox</a:t>
+            </a:r>
+            <a:endParaRPr lang="en-US" dirty="0"/>
+          </a:p>
+          <a:p>
+            <a:pPr marL="0" indent="0">
+              <a:buNone/>
+            </a:pPr>
+            <a:endParaRPr lang="en-US" dirty="0"/>
+          </a:p>
+        </p:txBody>
+      </p:sp>
+    </p:spTree>
+    <p:extLst>
+      <p:ext uri="{BB962C8B-B14F-4D97-AF65-F5344CB8AC3E}">
+        <p14:creationId xmlns:p14="http://schemas.microsoft.com/office/powerpoint/2010/main" val="3864238647"/>
+      </p:ext>
+    </p:extLst>
+  </p:cSld>
+  <p:clrMapOvr>
+    <a:masterClrMapping/>
+  </p:clrMapOvr>
+  <mc:AlternateContent xmlns:mc="http://schemas.openxmlformats.org/markup-compatibility/2006">
+    <mc:Choice xmlns:p14="http://schemas.microsoft.com/office/powerpoint/2010/main" Requires="p14">
+      <p:transition spd="med" p14:dur="700">
+        <p:fade/>
+      </p:transition>
+    </mc:Choice>
+    <mc:Fallback>
+      <p:transition spd="med">
+        <p:fade/>
+      </p:transition>
+    </mc:Fallback>
+  </mc:AlternateContent>
+</p:sld>
+</file>
+
+<file path=ppt/slides/slide2.xml><?xml version="1.0" encoding="utf-8"?>
+<p:sld xmlns:a="http://schemas.openxmlformats.org/drawingml/2006/main" xmlns:r="http://schemas.openxmlformats.org/officeDocument/2006/relationships" xmlns:p="http://schemas.openxmlformats.org/presentationml/2006/main">
+  <p:cSld>
+    <p:bg>
+      <p:bgPr>
+        <a:blipFill>
+          <a:blip r:embed="rId2">
+            <a:extLst/>
+          </a:blip>
+          <a:stretch/>
+        </a:blipFill>
+        <a:effectLst/>
+      </p:bgPr>
+    </p:bg>
+    <p:spTree>
+      <p:nvGrpSpPr>
+        <p:cNvPr id="1" name=""/>
+        <p:cNvGrpSpPr/>
+        <p:nvPr/>
+      </p:nvGrpSpPr>
+      <p:grpSpPr>
+        <a:xfrm>
+          <a:off x="0" y="0"/>
+          <a:ext cx="0" cy="0"/>
+          <a:chOff x="0" y="0"/>
+          <a:chExt cx="0" cy="0"/>
+        </a:xfrm>
+      </p:grpSpPr>
+      <p:pic>
+        <p:nvPicPr>
+          <p:cNvPr id="17" name="Picture 16" descr="A close up of a logo&#10;&#10;Description generated with very high confidence">
+            <a:extLst>
+              <a:ext uri="{FF2B5EF4-FFF2-40B4-BE49-F238E27FC236}">
+                <a16:creationId xmlns:a16="http://schemas.microsoft.com/office/drawing/2014/main" id="{18BD78ED-75E1-4879-B369-BC61F7C45E22}"/>
+              </a:ext>
+            </a:extLst>
+          </p:cNvPr>
+          <p:cNvPicPr>
+            <a:picLocks noGrp="1" noRot="1" noChangeAspect="1" noMove="1" noResize="1" noEditPoints="1" noAdjustHandles="1" noChangeArrowheads="1" noChangeShapeType="1" noCrop="1"/>
+          </p:cNvPicPr>
+          <p:nvPr>
+            <p:extLst>
+              <p:ext uri="{386F3935-93C4-4BCD-93E2-E3B085C9AB24}">
+                <p16:designElem xmlns:p16="http://schemas.microsoft.com/office/powerpoint/2015/main" val="1"/>
+              </p:ext>
+            </p:extLst>
+          </p:nvPr>
+        </p:nvPicPr>
+        <p:blipFill>
+          <a:blip r:embed="rId3">
+            <a:extLst>
+              <a:ext uri="{28A0092B-C50C-407E-A947-70E740481C1C}">
+                <a14:useLocalDpi xmlns:a14="http://schemas.microsoft.com/office/drawing/2010/main" val="0"/>
+              </a:ext>
+            </a:extLst>
+          </a:blip>
+          <a:stretch>
+            <a:fillRect/>
+          </a:stretch>
+        </p:blipFill>
+        <p:spPr>
+          <a:xfrm>
+            <a:off x="0" y="0"/>
+            <a:ext cx="12185650" cy="6856214"/>
+          </a:xfrm>
+          <a:prstGeom prst="rect">
+            <a:avLst/>
+          </a:prstGeom>
+        </p:spPr>
+      </p:pic>
+      <p:sp useBgFill="1">
+        <p:nvSpPr>
+          <p:cNvPr id="19" name="Rectangle 18">
+            <a:extLst>
+              <a:ext uri="{FF2B5EF4-FFF2-40B4-BE49-F238E27FC236}">
+                <a16:creationId xmlns:a16="http://schemas.microsoft.com/office/drawing/2014/main" id="{3D1E5586-8BB5-40F6-96C3-2E87DD7CE5CD}"/>
+              </a:ext>
+            </a:extLst>
+          </p:cNvPr>
+          <p:cNvSpPr>
+            <a:spLocks noGrp="1" noRot="1" noChangeAspect="1" noMove="1" noResize="1" noEditPoints="1" noAdjustHandles="1" noChangeArrowheads="1" noChangeShapeType="1" noTextEdit="1"/>
+          </p:cNvSpPr>
+          <p:nvPr>
+            <p:extLst>
+              <p:ext uri="{386F3935-93C4-4BCD-93E2-E3B085C9AB24}">
+                <p16:designElem xmlns:p16="http://schemas.microsoft.com/office/powerpoint/2015/main" val="1"/>
+              </p:ext>
+            </p:extLst>
+          </p:nvPr>
+        </p:nvSpPr>
+        <p:spPr>
+          <a:xfrm>
+            <a:off x="0" y="0"/>
+            <a:ext cx="12188825" cy="6858000"/>
+          </a:xfrm>
+          <a:prstGeom prst="rect">
+            <a:avLst/>
+          </a:prstGeom>
+          <a:ln>
+            <a:noFill/>
+          </a:ln>
+        </p:spPr>
+        <p:style>
+          <a:lnRef idx="2">
+            <a:schemeClr val="accent1">
+              <a:shade val="50000"/>
+            </a:schemeClr>
+          </a:lnRef>
+          <a:fillRef idx="1">
+            <a:schemeClr val="accent1"/>
+          </a:fillRef>
+          <a:effectRef idx="0">
+            <a:schemeClr val="accent1"/>
+          </a:effectRef>
+          <a:fontRef idx="minor">
+            <a:schemeClr val="lt1"/>
+          </a:fontRef>
+        </p:style>
+        <p:txBody>
+          <a:bodyPr rtlCol="0" anchor="ctr"/>
+          <a:lstStyle/>
+          <a:p>
+            <a:pPr algn="ctr"/>
+            <a:endParaRPr lang="en-US"/>
+          </a:p>
+        </p:txBody>
+      </p:sp>
+      <p:cxnSp>
+        <p:nvCxnSpPr>
+          <p:cNvPr id="21" name="Straight Connector 20">
+            <a:extLst>
+              <a:ext uri="{FF2B5EF4-FFF2-40B4-BE49-F238E27FC236}">
+                <a16:creationId xmlns:a16="http://schemas.microsoft.com/office/drawing/2014/main" id="{8A832D40-B9E2-4CE7-9E0A-B35591EA2035}"/>
+              </a:ext>
+            </a:extLst>
+          </p:cNvPr>
+          <p:cNvCxnSpPr>
+            <a:cxnSpLocks noGrp="1" noRot="1" noChangeAspect="1" noMove="1" noResize="1" noEditPoints="1" noAdjustHandles="1" noChangeArrowheads="1" noChangeShapeType="1"/>
+          </p:cNvCxnSpPr>
+          <p:nvPr>
+            <p:extLst>
+              <p:ext uri="{386F3935-93C4-4BCD-93E2-E3B085C9AB24}">
+                <p16:designElem xmlns:p16="http://schemas.microsoft.com/office/powerpoint/2015/main" val="1"/>
+              </p:ext>
+            </p:extLst>
+          </p:nvPr>
+        </p:nvCxnSpPr>
+        <p:spPr>
+          <a:xfrm>
+            <a:off x="5844106" y="3810000"/>
+            <a:ext cx="500613" cy="0"/>
+          </a:xfrm>
+          <a:prstGeom prst="line">
+            <a:avLst/>
+          </a:prstGeom>
+          <a:ln w="19050"/>
+        </p:spPr>
+        <p:style>
+          <a:lnRef idx="1">
+            <a:schemeClr val="accent1"/>
+          </a:lnRef>
+          <a:fillRef idx="0">
+            <a:schemeClr val="accent1"/>
+          </a:fillRef>
+          <a:effectRef idx="0">
+            <a:schemeClr val="accent1"/>
+          </a:effectRef>
+          <a:fontRef idx="minor">
+            <a:schemeClr val="tx1"/>
+          </a:fontRef>
+        </p:style>
+      </p:cxnSp>
+      <p:sp>
+        <p:nvSpPr>
+          <p:cNvPr id="2" name="Title 1">
+            <a:extLst>
+              <a:ext uri="{FF2B5EF4-FFF2-40B4-BE49-F238E27FC236}">
+                <a16:creationId xmlns:a16="http://schemas.microsoft.com/office/drawing/2014/main" id="{B37F24EF-6214-4E2F-80C0-139DDFF08937}"/>
+              </a:ext>
+            </a:extLst>
+          </p:cNvPr>
+          <p:cNvSpPr>
+            <a:spLocks noGrp="1"/>
+          </p:cNvSpPr>
+          <p:nvPr>
+            <p:ph type="title"/>
+          </p:nvPr>
+        </p:nvSpPr>
+        <p:spPr>
+          <a:xfrm>
+            <a:off x="1993285" y="1354668"/>
+            <a:ext cx="8202255" cy="2346475"/>
+          </a:xfrm>
+        </p:spPr>
+        <p:txBody>
+          <a:bodyPr vert="horz" lIns="91440" tIns="45720" rIns="91440" bIns="45720" rtlCol="0" anchor="b">
+            <a:normAutofit/>
+          </a:bodyPr>
+          <a:lstStyle/>
+          <a:p>
+            <a:pPr algn="ctr" defTabSz="457200"/>
+            <a:r>
+              <a:rPr lang="en-US" sz="5900"/>
+              <a:t>Recap</a:t>
+            </a:r>
+          </a:p>
+        </p:txBody>
+      </p:sp>
+      <p:sp>
+        <p:nvSpPr>
+          <p:cNvPr id="3" name="Text Placeholder 2">
+            <a:extLst>
+              <a:ext uri="{FF2B5EF4-FFF2-40B4-BE49-F238E27FC236}">
+                <a16:creationId xmlns:a16="http://schemas.microsoft.com/office/drawing/2014/main" id="{29E40806-32E0-4EA9-A66C-221A4EB1759B}"/>
+              </a:ext>
+            </a:extLst>
+          </p:cNvPr>
+          <p:cNvSpPr>
+            <a:spLocks noGrp="1"/>
+          </p:cNvSpPr>
+          <p:nvPr>
+            <p:ph type="body" idx="1"/>
+          </p:nvPr>
+        </p:nvSpPr>
+        <p:spPr>
+          <a:xfrm>
+            <a:off x="2496486" y="3940629"/>
+            <a:ext cx="7195852" cy="1240970"/>
+          </a:xfrm>
+        </p:spPr>
+        <p:txBody>
+          <a:bodyPr vert="horz" lIns="91440" tIns="45720" rIns="91440" bIns="45720" rtlCol="0" anchor="t">
+            <a:normAutofit/>
+          </a:bodyPr>
+          <a:lstStyle/>
+          <a:p>
+            <a:pPr algn="ctr" defTabSz="457200"/>
+            <a:r>
+              <a:rPr lang="en-US" sz="1800"/>
+              <a:t>Revision on XAML Layouts</a:t>
+            </a:r>
+          </a:p>
+        </p:txBody>
+      </p:sp>
+    </p:spTree>
+    <p:extLst>
+      <p:ext uri="{BB962C8B-B14F-4D97-AF65-F5344CB8AC3E}">
+        <p14:creationId xmlns:p14="http://schemas.microsoft.com/office/powerpoint/2010/main" val="3152791068"/>
+      </p:ext>
+    </p:extLst>
+  </p:cSld>
+  <p:clrMapOvr>
+    <a:masterClrMapping/>
+  </p:clrMapOvr>
+  <mc:AlternateContent xmlns:mc="http://schemas.openxmlformats.org/markup-compatibility/2006" xmlns:p14="http://schemas.microsoft.com/office/powerpoint/2010/main">
+    <mc:Choice Requires="p14">
+      <p:transition spd="med" p14:dur="700">
+        <p:fade/>
+      </p:transition>
+    </mc:Choice>
+    <mc:Fallback xmlns="">
+      <p:transition spd="med">
+        <p:fade/>
+      </p:transition>
+    </mc:Fallback>
+  </mc:AlternateContent>
+</p:sld>
+</file>
+
+<file path=ppt/slides/slide20.xml><?xml version="1.0" encoding="utf-8"?>
+<p:sld xmlns:a="http://schemas.openxmlformats.org/drawingml/2006/main" xmlns:r="http://schemas.openxmlformats.org/officeDocument/2006/relationships" xmlns:p="http://schemas.openxmlformats.org/presentationml/2006/main">
+  <p:cSld>
+    <p:bg>
+      <p:bgPr>
+        <a:blipFill>
+          <a:blip r:embed="rId2">
+            <a:extLst/>
+          </a:blip>
+          <a:stretch/>
+        </a:blipFill>
+        <a:effectLst/>
+      </p:bgPr>
+    </p:bg>
+    <p:spTree>
+      <p:nvGrpSpPr>
+        <p:cNvPr id="1" name=""/>
+        <p:cNvGrpSpPr/>
+        <p:nvPr/>
+      </p:nvGrpSpPr>
+      <p:grpSpPr>
+        <a:xfrm>
+          <a:off x="0" y="0"/>
+          <a:ext cx="0" cy="0"/>
+          <a:chOff x="0" y="0"/>
+          <a:chExt cx="0" cy="0"/>
+        </a:xfrm>
+      </p:grpSpPr>
+      <p:sp useBgFill="1">
+        <p:nvSpPr>
+          <p:cNvPr id="8" name="Rectangle 7">
+            <a:extLst>
+              <a:ext uri="{FF2B5EF4-FFF2-40B4-BE49-F238E27FC236}">
+                <a16:creationId xmlns:a16="http://schemas.microsoft.com/office/drawing/2014/main" id="{50E53EDA-3B94-4F6B-9E86-D3BB9EBB9616}"/>
+              </a:ext>
+            </a:extLst>
+          </p:cNvPr>
+          <p:cNvSpPr>
+            <a:spLocks noGrp="1" noRot="1" noChangeAspect="1" noMove="1" noResize="1" noEditPoints="1" noAdjustHandles="1" noChangeArrowheads="1" noChangeShapeType="1" noTextEdit="1"/>
+          </p:cNvSpPr>
+          <p:nvPr>
+            <p:extLst>
+              <p:ext uri="{386F3935-93C4-4BCD-93E2-E3B085C9AB24}">
+                <p16:designElem xmlns:p16="http://schemas.microsoft.com/office/powerpoint/2015/main" val="1"/>
+              </p:ext>
+            </p:extLst>
+          </p:nvPr>
+        </p:nvSpPr>
+        <p:spPr>
+          <a:xfrm>
+            <a:off x="0" y="0"/>
+            <a:ext cx="12188825" cy="6858000"/>
+          </a:xfrm>
+          <a:prstGeom prst="rect">
+            <a:avLst/>
+          </a:prstGeom>
+          <a:ln>
+            <a:noFill/>
+          </a:ln>
+        </p:spPr>
+        <p:style>
+          <a:lnRef idx="2">
+            <a:schemeClr val="accent1">
+              <a:shade val="50000"/>
+            </a:schemeClr>
+          </a:lnRef>
+          <a:fillRef idx="1">
+            <a:schemeClr val="accent1"/>
+          </a:fillRef>
+          <a:effectRef idx="0">
+            <a:schemeClr val="accent1"/>
+          </a:effectRef>
+          <a:fontRef idx="minor">
+            <a:schemeClr val="lt1"/>
+          </a:fontRef>
+        </p:style>
+        <p:txBody>
+          <a:bodyPr rtlCol="0" anchor="ctr"/>
+          <a:lstStyle/>
+          <a:p>
+            <a:pPr algn="ctr"/>
+            <a:endParaRPr lang="en-US"/>
+          </a:p>
+        </p:txBody>
+      </p:sp>
+      <p:cxnSp>
+        <p:nvCxnSpPr>
+          <p:cNvPr id="10" name="Straight Connector 9">
+            <a:extLst>
+              <a:ext uri="{FF2B5EF4-FFF2-40B4-BE49-F238E27FC236}">
+                <a16:creationId xmlns:a16="http://schemas.microsoft.com/office/drawing/2014/main" id="{30EFD79F-7790-479B-B7DB-BD0D8C101DDD}"/>
+              </a:ext>
+            </a:extLst>
+          </p:cNvPr>
+          <p:cNvCxnSpPr>
+            <a:cxnSpLocks noGrp="1" noRot="1" noChangeAspect="1" noMove="1" noResize="1" noEditPoints="1" noAdjustHandles="1" noChangeArrowheads="1" noChangeShapeType="1"/>
+          </p:cNvCxnSpPr>
+          <p:nvPr>
+            <p:extLst>
+              <p:ext uri="{386F3935-93C4-4BCD-93E2-E3B085C9AB24}">
+                <p16:designElem xmlns:p16="http://schemas.microsoft.com/office/powerpoint/2015/main" val="1"/>
+              </p:ext>
+            </p:extLst>
+          </p:nvPr>
+        </p:nvCxnSpPr>
+        <p:spPr>
+          <a:xfrm>
+            <a:off x="4665707" y="1668780"/>
+            <a:ext cx="0" cy="3520440"/>
+          </a:xfrm>
+          <a:prstGeom prst="line">
+            <a:avLst/>
+          </a:prstGeom>
+          <a:ln w="19050"/>
+        </p:spPr>
+        <p:style>
+          <a:lnRef idx="1">
+            <a:schemeClr val="accent1"/>
+          </a:lnRef>
+          <a:fillRef idx="0">
+            <a:schemeClr val="accent1"/>
+          </a:fillRef>
+          <a:effectRef idx="0">
+            <a:schemeClr val="accent1"/>
+          </a:effectRef>
+          <a:fontRef idx="minor">
+            <a:schemeClr val="tx1"/>
+          </a:fontRef>
+        </p:style>
+      </p:cxnSp>
+      <p:sp>
+        <p:nvSpPr>
+          <p:cNvPr id="2" name="Title 1"/>
+          <p:cNvSpPr>
+            <a:spLocks noGrp="1"/>
+          </p:cNvSpPr>
+          <p:nvPr>
+            <p:ph type="title"/>
+          </p:nvPr>
+        </p:nvSpPr>
+        <p:spPr>
+          <a:xfrm>
+            <a:off x="685620" y="1150076"/>
+            <a:ext cx="3658436" cy="4557849"/>
+          </a:xfrm>
+        </p:spPr>
+        <p:txBody>
+          <a:bodyPr>
+            <a:normAutofit/>
+          </a:bodyPr>
+          <a:lstStyle/>
+          <a:p>
+            <a:pPr algn="r"/>
+            <a:r>
+              <a:rPr lang="en-US" dirty="0"/>
+              <a:t>Choose A Suitable Component</a:t>
+            </a:r>
+            <a:endParaRPr lang="en-US"/>
+          </a:p>
+        </p:txBody>
+      </p:sp>
+      <p:sp>
+        <p:nvSpPr>
+          <p:cNvPr id="3" name="Content Placeholder 2"/>
+          <p:cNvSpPr>
+            <a:spLocks noGrp="1"/>
+          </p:cNvSpPr>
+          <p:nvPr>
+            <p:ph idx="1"/>
+          </p:nvPr>
+        </p:nvSpPr>
+        <p:spPr>
+          <a:xfrm>
+            <a:off x="4987358" y="1150076"/>
+            <a:ext cx="6515846" cy="4557849"/>
+          </a:xfrm>
+        </p:spPr>
+        <p:txBody>
+          <a:bodyPr>
+            <a:normAutofit/>
+          </a:bodyPr>
+          <a:lstStyle/>
+          <a:p>
+            <a:pPr marL="0" indent="0">
+              <a:buNone/>
+            </a:pPr>
+            <a:r>
+              <a:rPr lang="en-US" dirty="0"/>
+              <a:t>A pizzeria wants to allow user to choose different types of toppings when user orders pizza using their app. Which component suits the purpose the most?</a:t>
+            </a:r>
+          </a:p>
+          <a:p>
+            <a:pPr marL="0" indent="0">
+              <a:buNone/>
+            </a:pPr>
+            <a:r>
+              <a:rPr lang="en-US" dirty="0"/>
+              <a:t>(Example: User A can choose a pizza with pineapple and chicken toppings while User B can choose a pizza with sausage only topping)</a:t>
+            </a:r>
+          </a:p>
+          <a:p>
+            <a:pPr marL="342900" indent="-342900">
+              <a:buAutoNum type="arabicPeriod"/>
+            </a:pPr>
+            <a:r>
+              <a:rPr lang="en-US" dirty="0" err="1"/>
+              <a:t>ComboBox</a:t>
+            </a:r>
+            <a:endParaRPr lang="en-US" dirty="0"/>
+          </a:p>
+          <a:p>
+            <a:pPr marL="342900" indent="-342900">
+              <a:buAutoNum type="arabicPeriod"/>
+            </a:pPr>
+            <a:r>
+              <a:rPr lang="en-US" dirty="0" err="1"/>
+              <a:t>CheckBox</a:t>
+            </a:r>
+            <a:endParaRPr lang="en-US" dirty="0"/>
+          </a:p>
+          <a:p>
+            <a:pPr marL="342900" indent="-342900">
+              <a:buAutoNum type="arabicPeriod"/>
+            </a:pPr>
+            <a:r>
+              <a:rPr lang="en-US" dirty="0"/>
+              <a:t>Slider</a:t>
+            </a:r>
+          </a:p>
+          <a:p>
+            <a:pPr marL="342900" indent="-342900">
+              <a:buAutoNum type="arabicPeriod"/>
+            </a:pPr>
+            <a:r>
+              <a:rPr lang="en-US" dirty="0" err="1"/>
+              <a:t>ProgressBar</a:t>
+            </a:r>
+            <a:endParaRPr lang="en-US" dirty="0"/>
+          </a:p>
+        </p:txBody>
+      </p:sp>
+    </p:spTree>
+    <p:extLst>
+      <p:ext uri="{BB962C8B-B14F-4D97-AF65-F5344CB8AC3E}">
+        <p14:creationId xmlns:p14="http://schemas.microsoft.com/office/powerpoint/2010/main" val="70572723"/>
+      </p:ext>
+    </p:extLst>
+  </p:cSld>
+  <p:clrMapOvr>
+    <a:masterClrMapping/>
+  </p:clrMapOvr>
+  <mc:AlternateContent xmlns:mc="http://schemas.openxmlformats.org/markup-compatibility/2006">
+    <mc:Choice xmlns:p14="http://schemas.microsoft.com/office/powerpoint/2010/main" Requires="p14">
+      <p:transition spd="med" p14:dur="700">
+        <p:fade/>
+      </p:transition>
+    </mc:Choice>
+    <mc:Fallback>
+      <p:transition spd="med">
+        <p:fade/>
+      </p:transition>
+    </mc:Fallback>
+  </mc:AlternateContent>
+</p:sld>
+</file>
+
+<file path=ppt/slides/slide21.xml><?xml version="1.0" encoding="utf-8"?>
+<p:sld xmlns:a="http://schemas.openxmlformats.org/drawingml/2006/main" xmlns:r="http://schemas.openxmlformats.org/officeDocument/2006/relationships" xmlns:p="http://schemas.openxmlformats.org/presentationml/2006/main">
+  <p:cSld>
+    <p:bg>
+      <p:bgPr>
+        <a:blipFill>
+          <a:blip r:embed="rId2">
+            <a:extLst/>
+          </a:blip>
+          <a:stretch/>
+        </a:blipFill>
+        <a:effectLst/>
+      </p:bgPr>
+    </p:bg>
+    <p:spTree>
+      <p:nvGrpSpPr>
+        <p:cNvPr id="1" name=""/>
+        <p:cNvGrpSpPr/>
+        <p:nvPr/>
+      </p:nvGrpSpPr>
+      <p:grpSpPr>
+        <a:xfrm>
+          <a:off x="0" y="0"/>
+          <a:ext cx="0" cy="0"/>
+          <a:chOff x="0" y="0"/>
+          <a:chExt cx="0" cy="0"/>
+        </a:xfrm>
+      </p:grpSpPr>
+      <p:pic>
+        <p:nvPicPr>
+          <p:cNvPr id="8" name="Picture 7" descr="A close up of a logo&#10;&#10;Description generated with very high confidence">
+            <a:extLst>
+              <a:ext uri="{FF2B5EF4-FFF2-40B4-BE49-F238E27FC236}">
+                <a16:creationId xmlns:a16="http://schemas.microsoft.com/office/drawing/2014/main" id="{18BD78ED-75E1-4879-B369-BC61F7C45E22}"/>
+              </a:ext>
+            </a:extLst>
+          </p:cNvPr>
+          <p:cNvPicPr>
+            <a:picLocks noGrp="1" noRot="1" noChangeAspect="1" noMove="1" noResize="1" noEditPoints="1" noAdjustHandles="1" noChangeArrowheads="1" noChangeShapeType="1" noCrop="1"/>
+          </p:cNvPicPr>
+          <p:nvPr>
+            <p:extLst>
+              <p:ext uri="{386F3935-93C4-4BCD-93E2-E3B085C9AB24}">
+                <p16:designElem xmlns:p16="http://schemas.microsoft.com/office/powerpoint/2015/main" val="1"/>
+              </p:ext>
+            </p:extLst>
+          </p:nvPr>
+        </p:nvPicPr>
+        <p:blipFill>
+          <a:blip r:embed="rId3">
+            <a:extLst>
+              <a:ext uri="{28A0092B-C50C-407E-A947-70E740481C1C}">
+                <a14:useLocalDpi xmlns:a14="http://schemas.microsoft.com/office/drawing/2010/main" val="0"/>
+              </a:ext>
+            </a:extLst>
+          </a:blip>
+          <a:stretch>
+            <a:fillRect/>
+          </a:stretch>
+        </p:blipFill>
+        <p:spPr>
+          <a:xfrm>
+            <a:off x="0" y="0"/>
+            <a:ext cx="12185650" cy="6856214"/>
+          </a:xfrm>
+          <a:prstGeom prst="rect">
+            <a:avLst/>
+          </a:prstGeom>
+        </p:spPr>
+      </p:pic>
+      <p:sp useBgFill="1">
+        <p:nvSpPr>
+          <p:cNvPr id="10" name="Rectangle 9">
+            <a:extLst>
+              <a:ext uri="{FF2B5EF4-FFF2-40B4-BE49-F238E27FC236}">
+                <a16:creationId xmlns:a16="http://schemas.microsoft.com/office/drawing/2014/main" id="{3D1E5586-8BB5-40F6-96C3-2E87DD7CE5CD}"/>
+              </a:ext>
+            </a:extLst>
+          </p:cNvPr>
+          <p:cNvSpPr>
+            <a:spLocks noGrp="1" noRot="1" noChangeAspect="1" noMove="1" noResize="1" noEditPoints="1" noAdjustHandles="1" noChangeArrowheads="1" noChangeShapeType="1" noTextEdit="1"/>
+          </p:cNvSpPr>
+          <p:nvPr>
+            <p:extLst>
+              <p:ext uri="{386F3935-93C4-4BCD-93E2-E3B085C9AB24}">
+                <p16:designElem xmlns:p16="http://schemas.microsoft.com/office/powerpoint/2015/main" val="1"/>
+              </p:ext>
+            </p:extLst>
+          </p:nvPr>
+        </p:nvSpPr>
+        <p:spPr>
+          <a:xfrm>
+            <a:off x="0" y="0"/>
+            <a:ext cx="12188825" cy="6858000"/>
+          </a:xfrm>
+          <a:prstGeom prst="rect">
+            <a:avLst/>
+          </a:prstGeom>
+          <a:ln>
+            <a:noFill/>
+          </a:ln>
+        </p:spPr>
+        <p:style>
+          <a:lnRef idx="2">
+            <a:schemeClr val="accent1">
+              <a:shade val="50000"/>
+            </a:schemeClr>
+          </a:lnRef>
+          <a:fillRef idx="1">
+            <a:schemeClr val="accent1"/>
+          </a:fillRef>
+          <a:effectRef idx="0">
+            <a:schemeClr val="accent1"/>
+          </a:effectRef>
+          <a:fontRef idx="minor">
+            <a:schemeClr val="lt1"/>
+          </a:fontRef>
+        </p:style>
+        <p:txBody>
+          <a:bodyPr rtlCol="0" anchor="ctr"/>
+          <a:lstStyle/>
+          <a:p>
+            <a:pPr algn="ctr"/>
+            <a:endParaRPr lang="en-US"/>
+          </a:p>
+        </p:txBody>
+      </p:sp>
+      <p:cxnSp>
+        <p:nvCxnSpPr>
+          <p:cNvPr id="12" name="Straight Connector 11">
+            <a:extLst>
+              <a:ext uri="{FF2B5EF4-FFF2-40B4-BE49-F238E27FC236}">
+                <a16:creationId xmlns:a16="http://schemas.microsoft.com/office/drawing/2014/main" id="{8A832D40-B9E2-4CE7-9E0A-B35591EA2035}"/>
+              </a:ext>
+            </a:extLst>
+          </p:cNvPr>
+          <p:cNvCxnSpPr>
+            <a:cxnSpLocks noGrp="1" noRot="1" noChangeAspect="1" noMove="1" noResize="1" noEditPoints="1" noAdjustHandles="1" noChangeArrowheads="1" noChangeShapeType="1"/>
+          </p:cNvCxnSpPr>
+          <p:nvPr>
+            <p:extLst>
+              <p:ext uri="{386F3935-93C4-4BCD-93E2-E3B085C9AB24}">
+                <p16:designElem xmlns:p16="http://schemas.microsoft.com/office/powerpoint/2015/main" val="1"/>
+              </p:ext>
+            </p:extLst>
+          </p:nvPr>
+        </p:nvCxnSpPr>
+        <p:spPr>
+          <a:xfrm>
+            <a:off x="5844106" y="3810000"/>
+            <a:ext cx="500613" cy="0"/>
+          </a:xfrm>
+          <a:prstGeom prst="line">
+            <a:avLst/>
+          </a:prstGeom>
+          <a:ln w="19050"/>
+        </p:spPr>
+        <p:style>
+          <a:lnRef idx="1">
+            <a:schemeClr val="accent1"/>
+          </a:lnRef>
+          <a:fillRef idx="0">
+            <a:schemeClr val="accent1"/>
+          </a:fillRef>
+          <a:effectRef idx="0">
+            <a:schemeClr val="accent1"/>
+          </a:effectRef>
+          <a:fontRef idx="minor">
+            <a:schemeClr val="tx1"/>
+          </a:fontRef>
+        </p:style>
+      </p:cxnSp>
+      <p:sp>
+        <p:nvSpPr>
           <p:cNvPr id="2" name="Title 1">
             <a:extLst>
               <a:ext uri="{FF2B5EF4-FFF2-40B4-BE49-F238E27FC236}">
@@ -13070,7 +14341,7 @@
 </p:sld>
 </file>
 
-<file path=ppt/slides/slide18.xml><?xml version="1.0" encoding="utf-8"?>
+<file path=ppt/slides/slide22.xml><?xml version="1.0" encoding="utf-8"?>
 <p:sld xmlns:a="http://schemas.openxmlformats.org/drawingml/2006/main" xmlns:r="http://schemas.openxmlformats.org/officeDocument/2006/relationships" xmlns:p="http://schemas.openxmlformats.org/presentationml/2006/main">
   <p:cSld>
     <p:bg>
@@ -18292,13 +19563,13 @@
   <p:clrMapOvr>
     <a:masterClrMapping/>
   </p:clrMapOvr>
-  <mc:AlternateContent xmlns:mc="http://schemas.openxmlformats.org/markup-compatibility/2006">
-    <mc:Choice xmlns:p14="http://schemas.microsoft.com/office/powerpoint/2010/main" Requires="p14">
+  <mc:AlternateContent xmlns:mc="http://schemas.openxmlformats.org/markup-compatibility/2006" xmlns:p14="http://schemas.microsoft.com/office/powerpoint/2010/main">
+    <mc:Choice Requires="p14">
       <p:transition spd="med" p14:dur="700">
         <p:fade/>
       </p:transition>
     </mc:Choice>
-    <mc:Fallback>
+    <mc:Fallback xmlns="">
       <p:transition spd="med">
         <p:fade/>
       </p:transition>
@@ -18307,7 +19578,7 @@
 </p:sld>
 </file>
 
-<file path=ppt/slides/slide19.xml><?xml version="1.0" encoding="utf-8"?>
+<file path=ppt/slides/slide23.xml><?xml version="1.0" encoding="utf-8"?>
 <p:sld xmlns:a="http://schemas.openxmlformats.org/drawingml/2006/main" xmlns:r="http://schemas.openxmlformats.org/officeDocument/2006/relationships" xmlns:p="http://schemas.openxmlformats.org/presentationml/2006/main" show="0">
   <p:cSld>
     <p:spTree>
@@ -18405,276 +19676,7 @@
 </p:sld>
 </file>
 
-<file path=ppt/slides/slide2.xml><?xml version="1.0" encoding="utf-8"?>
-<p:sld xmlns:a="http://schemas.openxmlformats.org/drawingml/2006/main" xmlns:r="http://schemas.openxmlformats.org/officeDocument/2006/relationships" xmlns:p="http://schemas.openxmlformats.org/presentationml/2006/main">
-  <p:cSld>
-    <p:bg>
-      <p:bgPr>
-        <a:blipFill>
-          <a:blip r:embed="rId2">
-            <a:extLst/>
-          </a:blip>
-          <a:stretch/>
-        </a:blipFill>
-        <a:effectLst/>
-      </p:bgPr>
-    </p:bg>
-    <p:spTree>
-      <p:nvGrpSpPr>
-        <p:cNvPr id="1" name=""/>
-        <p:cNvGrpSpPr/>
-        <p:nvPr/>
-      </p:nvGrpSpPr>
-      <p:grpSpPr>
-        <a:xfrm>
-          <a:off x="0" y="0"/>
-          <a:ext cx="0" cy="0"/>
-          <a:chOff x="0" y="0"/>
-          <a:chExt cx="0" cy="0"/>
-        </a:xfrm>
-      </p:grpSpPr>
-      <p:pic>
-        <p:nvPicPr>
-          <p:cNvPr id="17" name="Picture 16" descr="A close up of a logo&#10;&#10;Description generated with very high confidence">
-            <a:extLst>
-              <a:ext uri="{FF2B5EF4-FFF2-40B4-BE49-F238E27FC236}">
-                <a16:creationId xmlns:a16="http://schemas.microsoft.com/office/drawing/2014/main" id="{18BD78ED-75E1-4879-B369-BC61F7C45E22}"/>
-              </a:ext>
-            </a:extLst>
-          </p:cNvPr>
-          <p:cNvPicPr>
-            <a:picLocks noGrp="1" noRot="1" noChangeAspect="1" noMove="1" noResize="1" noEditPoints="1" noAdjustHandles="1" noChangeArrowheads="1" noChangeShapeType="1" noCrop="1"/>
-          </p:cNvPicPr>
-          <p:nvPr>
-            <p:extLst>
-              <p:ext uri="{386F3935-93C4-4BCD-93E2-E3B085C9AB24}">
-                <p16:designElem xmlns:p16="http://schemas.microsoft.com/office/powerpoint/2015/main" val="1"/>
-              </p:ext>
-            </p:extLst>
-          </p:nvPr>
-        </p:nvPicPr>
-        <p:blipFill>
-          <a:blip r:embed="rId3">
-            <a:extLst>
-              <a:ext uri="{28A0092B-C50C-407E-A947-70E740481C1C}">
-                <a14:useLocalDpi xmlns:a14="http://schemas.microsoft.com/office/drawing/2010/main" val="0"/>
-              </a:ext>
-            </a:extLst>
-          </a:blip>
-          <a:stretch>
-            <a:fillRect/>
-          </a:stretch>
-        </p:blipFill>
-        <p:spPr>
-          <a:xfrm>
-            <a:off x="0" y="0"/>
-            <a:ext cx="12185650" cy="6856214"/>
-          </a:xfrm>
-          <a:prstGeom prst="rect">
-            <a:avLst/>
-          </a:prstGeom>
-        </p:spPr>
-      </p:pic>
-      <p:sp useBgFill="1">
-        <p:nvSpPr>
-          <p:cNvPr id="19" name="Rectangle 18">
-            <a:extLst>
-              <a:ext uri="{FF2B5EF4-FFF2-40B4-BE49-F238E27FC236}">
-                <a16:creationId xmlns:a16="http://schemas.microsoft.com/office/drawing/2014/main" id="{3D1E5586-8BB5-40F6-96C3-2E87DD7CE5CD}"/>
-              </a:ext>
-            </a:extLst>
-          </p:cNvPr>
-          <p:cNvSpPr>
-            <a:spLocks noGrp="1" noRot="1" noChangeAspect="1" noMove="1" noResize="1" noEditPoints="1" noAdjustHandles="1" noChangeArrowheads="1" noChangeShapeType="1" noTextEdit="1"/>
-          </p:cNvSpPr>
-          <p:nvPr>
-            <p:extLst>
-              <p:ext uri="{386F3935-93C4-4BCD-93E2-E3B085C9AB24}">
-                <p16:designElem xmlns:p16="http://schemas.microsoft.com/office/powerpoint/2015/main" val="1"/>
-              </p:ext>
-            </p:extLst>
-          </p:nvPr>
-        </p:nvSpPr>
-        <p:spPr>
-          <a:xfrm>
-            <a:off x="0" y="0"/>
-            <a:ext cx="12188825" cy="6858000"/>
-          </a:xfrm>
-          <a:prstGeom prst="rect">
-            <a:avLst/>
-          </a:prstGeom>
-          <a:ln>
-            <a:noFill/>
-          </a:ln>
-        </p:spPr>
-        <p:style>
-          <a:lnRef idx="2">
-            <a:schemeClr val="accent1">
-              <a:shade val="50000"/>
-            </a:schemeClr>
-          </a:lnRef>
-          <a:fillRef idx="1">
-            <a:schemeClr val="accent1"/>
-          </a:fillRef>
-          <a:effectRef idx="0">
-            <a:schemeClr val="accent1"/>
-          </a:effectRef>
-          <a:fontRef idx="minor">
-            <a:schemeClr val="lt1"/>
-          </a:fontRef>
-        </p:style>
-        <p:txBody>
-          <a:bodyPr rtlCol="0" anchor="ctr"/>
-          <a:lstStyle/>
-          <a:p>
-            <a:pPr algn="ctr"/>
-            <a:endParaRPr lang="en-US"/>
-          </a:p>
-        </p:txBody>
-      </p:sp>
-      <p:cxnSp>
-        <p:nvCxnSpPr>
-          <p:cNvPr id="21" name="Straight Connector 20">
-            <a:extLst>
-              <a:ext uri="{FF2B5EF4-FFF2-40B4-BE49-F238E27FC236}">
-                <a16:creationId xmlns:a16="http://schemas.microsoft.com/office/drawing/2014/main" id="{8A832D40-B9E2-4CE7-9E0A-B35591EA2035}"/>
-              </a:ext>
-            </a:extLst>
-          </p:cNvPr>
-          <p:cNvCxnSpPr>
-            <a:cxnSpLocks noGrp="1" noRot="1" noChangeAspect="1" noMove="1" noResize="1" noEditPoints="1" noAdjustHandles="1" noChangeArrowheads="1" noChangeShapeType="1"/>
-          </p:cNvCxnSpPr>
-          <p:nvPr>
-            <p:extLst>
-              <p:ext uri="{386F3935-93C4-4BCD-93E2-E3B085C9AB24}">
-                <p16:designElem xmlns:p16="http://schemas.microsoft.com/office/powerpoint/2015/main" val="1"/>
-              </p:ext>
-            </p:extLst>
-          </p:nvPr>
-        </p:nvCxnSpPr>
-        <p:spPr>
-          <a:xfrm>
-            <a:off x="5844106" y="3810000"/>
-            <a:ext cx="500613" cy="0"/>
-          </a:xfrm>
-          <a:prstGeom prst="line">
-            <a:avLst/>
-          </a:prstGeom>
-          <a:ln w="19050"/>
-        </p:spPr>
-        <p:style>
-          <a:lnRef idx="1">
-            <a:schemeClr val="accent1"/>
-          </a:lnRef>
-          <a:fillRef idx="0">
-            <a:schemeClr val="accent1"/>
-          </a:fillRef>
-          <a:effectRef idx="0">
-            <a:schemeClr val="accent1"/>
-          </a:effectRef>
-          <a:fontRef idx="minor">
-            <a:schemeClr val="tx1"/>
-          </a:fontRef>
-        </p:style>
-      </p:cxnSp>
-      <p:sp>
-        <p:nvSpPr>
-          <p:cNvPr id="2" name="Title 1">
-            <a:extLst>
-              <a:ext uri="{FF2B5EF4-FFF2-40B4-BE49-F238E27FC236}">
-                <a16:creationId xmlns:a16="http://schemas.microsoft.com/office/drawing/2014/main" id="{B37F24EF-6214-4E2F-80C0-139DDFF08937}"/>
-              </a:ext>
-            </a:extLst>
-          </p:cNvPr>
-          <p:cNvSpPr>
-            <a:spLocks noGrp="1"/>
-          </p:cNvSpPr>
-          <p:nvPr>
-            <p:ph type="title"/>
-          </p:nvPr>
-        </p:nvSpPr>
-        <p:spPr>
-          <a:xfrm>
-            <a:off x="1993285" y="1354668"/>
-            <a:ext cx="8202255" cy="2346475"/>
-          </a:xfrm>
-        </p:spPr>
-        <p:txBody>
-          <a:bodyPr vert="horz" lIns="91440" tIns="45720" rIns="91440" bIns="45720" rtlCol="0" anchor="b">
-            <a:normAutofit/>
-          </a:bodyPr>
-          <a:lstStyle/>
-          <a:p>
-            <a:pPr algn="ctr" defTabSz="457200"/>
-            <a:r>
-              <a:rPr lang="en-US" sz="5900"/>
-              <a:t>Recap</a:t>
-            </a:r>
-          </a:p>
-        </p:txBody>
-      </p:sp>
-      <p:sp>
-        <p:nvSpPr>
-          <p:cNvPr id="3" name="Text Placeholder 2">
-            <a:extLst>
-              <a:ext uri="{FF2B5EF4-FFF2-40B4-BE49-F238E27FC236}">
-                <a16:creationId xmlns:a16="http://schemas.microsoft.com/office/drawing/2014/main" id="{29E40806-32E0-4EA9-A66C-221A4EB1759B}"/>
-              </a:ext>
-            </a:extLst>
-          </p:cNvPr>
-          <p:cNvSpPr>
-            <a:spLocks noGrp="1"/>
-          </p:cNvSpPr>
-          <p:nvPr>
-            <p:ph type="body" idx="1"/>
-          </p:nvPr>
-        </p:nvSpPr>
-        <p:spPr>
-          <a:xfrm>
-            <a:off x="2496486" y="3940629"/>
-            <a:ext cx="7195852" cy="1240970"/>
-          </a:xfrm>
-        </p:spPr>
-        <p:txBody>
-          <a:bodyPr vert="horz" lIns="91440" tIns="45720" rIns="91440" bIns="45720" rtlCol="0" anchor="t">
-            <a:normAutofit/>
-          </a:bodyPr>
-          <a:lstStyle/>
-          <a:p>
-            <a:pPr algn="ctr" defTabSz="457200"/>
-            <a:r>
-              <a:rPr lang="en-US" sz="1800"/>
-              <a:t>Revision on XAML Layouts</a:t>
-            </a:r>
-          </a:p>
-        </p:txBody>
-      </p:sp>
-    </p:spTree>
-    <p:extLst>
-      <p:ext uri="{BB962C8B-B14F-4D97-AF65-F5344CB8AC3E}">
-        <p14:creationId xmlns:p14="http://schemas.microsoft.com/office/powerpoint/2010/main" val="3152791068"/>
-      </p:ext>
-    </p:extLst>
-  </p:cSld>
-  <p:clrMapOvr>
-    <a:masterClrMapping/>
-  </p:clrMapOvr>
-  <mc:AlternateContent xmlns:mc="http://schemas.openxmlformats.org/markup-compatibility/2006" xmlns:p14="http://schemas.microsoft.com/office/powerpoint/2010/main">
-    <mc:Choice Requires="p14">
-      <p:transition spd="med" p14:dur="700">
-        <p:fade/>
-      </p:transition>
-    </mc:Choice>
-    <mc:Fallback xmlns="">
-      <p:transition spd="med">
-        <p:fade/>
-      </p:transition>
-    </mc:Fallback>
-  </mc:AlternateContent>
-</p:sld>
-</file>
-
-<file path=ppt/slides/slide20.xml><?xml version="1.0" encoding="utf-8"?>
+<file path=ppt/slides/slide24.xml><?xml version="1.0" encoding="utf-8"?>
 <p:sld xmlns:a="http://schemas.openxmlformats.org/drawingml/2006/main" xmlns:r="http://schemas.openxmlformats.org/officeDocument/2006/relationships" xmlns:p="http://schemas.openxmlformats.org/presentationml/2006/main" show="0">
   <p:cSld>
     <p:spTree>
@@ -18769,7 +19771,7 @@
 </p:sld>
 </file>
 
-<file path=ppt/slides/slide21.xml><?xml version="1.0" encoding="utf-8"?>
+<file path=ppt/slides/slide25.xml><?xml version="1.0" encoding="utf-8"?>
 <p:sld xmlns:a="http://schemas.openxmlformats.org/drawingml/2006/main" xmlns:r="http://schemas.openxmlformats.org/officeDocument/2006/relationships" xmlns:p="http://schemas.openxmlformats.org/presentationml/2006/main" show="0">
   <p:cSld>
     <p:spTree>

</xml_diff>